<commit_message>
Update week 13 ppt
</commit_message>
<xml_diff>
--- a/进度汇报PPT汇总/week13.pptx
+++ b/进度汇报PPT汇总/week13.pptx
@@ -5,15 +5,19 @@
     <p:sldMasterId id="2147483648" r:id="rId1"/>
   </p:sldMasterIdLst>
   <p:notesMasterIdLst>
-    <p:notesMasterId r:id="rId5"/>
+    <p:notesMasterId r:id="rId9"/>
   </p:notesMasterIdLst>
   <p:handoutMasterIdLst>
-    <p:handoutMasterId r:id="rId7"/>
+    <p:handoutMasterId r:id="rId10"/>
   </p:handoutMasterIdLst>
   <p:sldIdLst>
-    <p:sldId id="312" r:id="rId3"/>
-    <p:sldId id="367" r:id="rId4"/>
-    <p:sldId id="361" r:id="rId6"/>
+    <p:sldId id="312" r:id="rId2"/>
+    <p:sldId id="367" r:id="rId3"/>
+    <p:sldId id="368" r:id="rId4"/>
+    <p:sldId id="369" r:id="rId5"/>
+    <p:sldId id="370" r:id="rId6"/>
+    <p:sldId id="371" r:id="rId7"/>
+    <p:sldId id="361" r:id="rId8"/>
   </p:sldIdLst>
   <p:sldSz cx="12192000" cy="6858000"/>
   <p:notesSz cx="6858000" cy="9144000"/>
@@ -112,7 +116,142 @@
       </a:defRPr>
     </a:lvl9pPr>
   </p:defaultTextStyle>
+  <p:extLst>
+    <p:ext uri="{EFAFB233-063F-42B5-8137-9DF3F51BA10A}">
+      <p15:sldGuideLst xmlns:p15="http://schemas.microsoft.com/office/powerpoint/2012/main"/>
+    </p:ext>
+  </p:extLst>
 </p:presentation>
+</file>
+
+<file path=ppt/changesInfos/changesInfo1.xml><?xml version="1.0" encoding="utf-8"?>
+<pc:chgInfo xmlns:a="http://schemas.openxmlformats.org/drawingml/2006/main" xmlns:r="http://schemas.openxmlformats.org/officeDocument/2006/relationships" xmlns:ac="http://schemas.microsoft.com/office/drawing/2013/main/command" xmlns:pc="http://schemas.microsoft.com/office/powerpoint/2013/main/command">
+  <pc:docChgLst>
+    <pc:chgData name="snade jack" userId="ba5019ad82b64393" providerId="LiveId" clId="{55F189A0-0F95-4A55-B5E4-662823826988}"/>
+    <pc:docChg chg="undo custSel addSld modSld">
+      <pc:chgData name="snade jack" userId="ba5019ad82b64393" providerId="LiveId" clId="{55F189A0-0F95-4A55-B5E4-662823826988}" dt="2022-05-21T02:01:27.814" v="280" actId="1076"/>
+      <pc:docMkLst>
+        <pc:docMk/>
+      </pc:docMkLst>
+      <pc:sldChg chg="modSp new mod">
+        <pc:chgData name="snade jack" userId="ba5019ad82b64393" providerId="LiveId" clId="{55F189A0-0F95-4A55-B5E4-662823826988}" dt="2022-05-21T01:57:44.045" v="127"/>
+        <pc:sldMkLst>
+          <pc:docMk/>
+          <pc:sldMk cId="2188342295" sldId="368"/>
+        </pc:sldMkLst>
+        <pc:spChg chg="mod">
+          <ac:chgData name="snade jack" userId="ba5019ad82b64393" providerId="LiveId" clId="{55F189A0-0F95-4A55-B5E4-662823826988}" dt="2022-05-21T01:56:04.742" v="2"/>
+          <ac:spMkLst>
+            <pc:docMk/>
+            <pc:sldMk cId="2188342295" sldId="368"/>
+            <ac:spMk id="2" creationId="{606FBA64-85B3-0BC3-589B-CF813B34D88F}"/>
+          </ac:spMkLst>
+        </pc:spChg>
+        <pc:spChg chg="mod">
+          <ac:chgData name="snade jack" userId="ba5019ad82b64393" providerId="LiveId" clId="{55F189A0-0F95-4A55-B5E4-662823826988}" dt="2022-05-21T01:57:44.045" v="127"/>
+          <ac:spMkLst>
+            <pc:docMk/>
+            <pc:sldMk cId="2188342295" sldId="368"/>
+            <ac:spMk id="3" creationId="{C667B299-2EB9-832E-FFAC-7E0F0D10C01F}"/>
+          </ac:spMkLst>
+        </pc:spChg>
+      </pc:sldChg>
+      <pc:sldChg chg="addSp modSp new mod">
+        <pc:chgData name="snade jack" userId="ba5019ad82b64393" providerId="LiveId" clId="{55F189A0-0F95-4A55-B5E4-662823826988}" dt="2022-05-21T01:58:51.366" v="227"/>
+        <pc:sldMkLst>
+          <pc:docMk/>
+          <pc:sldMk cId="2526896225" sldId="369"/>
+        </pc:sldMkLst>
+        <pc:spChg chg="mod">
+          <ac:chgData name="snade jack" userId="ba5019ad82b64393" providerId="LiveId" clId="{55F189A0-0F95-4A55-B5E4-662823826988}" dt="2022-05-21T01:57:48.284" v="132"/>
+          <ac:spMkLst>
+            <pc:docMk/>
+            <pc:sldMk cId="2526896225" sldId="369"/>
+            <ac:spMk id="2" creationId="{2149C24B-DD32-F277-F8BB-BFE3F5B5C8FD}"/>
+          </ac:spMkLst>
+        </pc:spChg>
+        <pc:spChg chg="mod">
+          <ac:chgData name="snade jack" userId="ba5019ad82b64393" providerId="LiveId" clId="{55F189A0-0F95-4A55-B5E4-662823826988}" dt="2022-05-21T01:58:51.366" v="227"/>
+          <ac:spMkLst>
+            <pc:docMk/>
+            <pc:sldMk cId="2526896225" sldId="369"/>
+            <ac:spMk id="3" creationId="{4244DD2A-53B1-F8DC-22F9-25FDEDE31D26}"/>
+          </ac:spMkLst>
+        </pc:spChg>
+        <pc:picChg chg="add mod">
+          <ac:chgData name="snade jack" userId="ba5019ad82b64393" providerId="LiveId" clId="{55F189A0-0F95-4A55-B5E4-662823826988}" dt="2022-05-21T01:58:31.477" v="181" actId="1076"/>
+          <ac:picMkLst>
+            <pc:docMk/>
+            <pc:sldMk cId="2526896225" sldId="369"/>
+            <ac:picMk id="6" creationId="{12434913-078F-5E4C-775E-C507CBF6C8A1}"/>
+          </ac:picMkLst>
+        </pc:picChg>
+      </pc:sldChg>
+      <pc:sldChg chg="addSp modSp new mod">
+        <pc:chgData name="snade jack" userId="ba5019ad82b64393" providerId="LiveId" clId="{55F189A0-0F95-4A55-B5E4-662823826988}" dt="2022-05-21T02:00:13.905" v="250" actId="1076"/>
+        <pc:sldMkLst>
+          <pc:docMk/>
+          <pc:sldMk cId="2347504704" sldId="370"/>
+        </pc:sldMkLst>
+        <pc:spChg chg="mod">
+          <ac:chgData name="snade jack" userId="ba5019ad82b64393" providerId="LiveId" clId="{55F189A0-0F95-4A55-B5E4-662823826988}" dt="2022-05-21T01:58:55.619" v="229"/>
+          <ac:spMkLst>
+            <pc:docMk/>
+            <pc:sldMk cId="2347504704" sldId="370"/>
+            <ac:spMk id="2" creationId="{8B96EE58-58BF-0E77-2A17-DEA21DD8F792}"/>
+          </ac:spMkLst>
+        </pc:spChg>
+        <pc:spChg chg="mod">
+          <ac:chgData name="snade jack" userId="ba5019ad82b64393" providerId="LiveId" clId="{55F189A0-0F95-4A55-B5E4-662823826988}" dt="2022-05-21T02:00:10.548" v="249"/>
+          <ac:spMkLst>
+            <pc:docMk/>
+            <pc:sldMk cId="2347504704" sldId="370"/>
+            <ac:spMk id="3" creationId="{D35F3449-A7BA-6BE9-351A-4BCB264B0202}"/>
+          </ac:spMkLst>
+        </pc:spChg>
+        <pc:picChg chg="add mod">
+          <ac:chgData name="snade jack" userId="ba5019ad82b64393" providerId="LiveId" clId="{55F189A0-0F95-4A55-B5E4-662823826988}" dt="2022-05-21T02:00:13.905" v="250" actId="1076"/>
+          <ac:picMkLst>
+            <pc:docMk/>
+            <pc:sldMk cId="2347504704" sldId="370"/>
+            <ac:picMk id="6" creationId="{EFD11C35-3923-93DB-47A3-6486C7B1E3CD}"/>
+          </ac:picMkLst>
+        </pc:picChg>
+      </pc:sldChg>
+      <pc:sldChg chg="addSp modSp new mod">
+        <pc:chgData name="snade jack" userId="ba5019ad82b64393" providerId="LiveId" clId="{55F189A0-0F95-4A55-B5E4-662823826988}" dt="2022-05-21T02:01:27.814" v="280" actId="1076"/>
+        <pc:sldMkLst>
+          <pc:docMk/>
+          <pc:sldMk cId="1227354387" sldId="371"/>
+        </pc:sldMkLst>
+        <pc:spChg chg="mod">
+          <ac:chgData name="snade jack" userId="ba5019ad82b64393" providerId="LiveId" clId="{55F189A0-0F95-4A55-B5E4-662823826988}" dt="2022-05-21T02:00:17.279" v="255"/>
+          <ac:spMkLst>
+            <pc:docMk/>
+            <pc:sldMk cId="1227354387" sldId="371"/>
+            <ac:spMk id="2" creationId="{F8FC960D-2D1B-0239-D7AD-9EC782862D42}"/>
+          </ac:spMkLst>
+        </pc:spChg>
+        <pc:spChg chg="mod">
+          <ac:chgData name="snade jack" userId="ba5019ad82b64393" providerId="LiveId" clId="{55F189A0-0F95-4A55-B5E4-662823826988}" dt="2022-05-21T02:01:19.305" v="274"/>
+          <ac:spMkLst>
+            <pc:docMk/>
+            <pc:sldMk cId="1227354387" sldId="371"/>
+            <ac:spMk id="3" creationId="{1244FD8C-BDF5-7356-DE89-15B71A3531CD}"/>
+          </ac:spMkLst>
+        </pc:spChg>
+        <pc:picChg chg="add mod">
+          <ac:chgData name="snade jack" userId="ba5019ad82b64393" providerId="LiveId" clId="{55F189A0-0F95-4A55-B5E4-662823826988}" dt="2022-05-21T02:01:27.814" v="280" actId="1076"/>
+          <ac:picMkLst>
+            <pc:docMk/>
+            <pc:sldMk cId="1227354387" sldId="371"/>
+            <ac:picMk id="6" creationId="{4109C5DD-6E06-5FA7-9123-72981257C767}"/>
+          </ac:picMkLst>
+        </pc:picChg>
+      </pc:sldChg>
+    </pc:docChg>
+  </pc:docChgLst>
+</pc:chgInfo>
 </file>
 
 <file path=ppt/handoutMasters/handoutMaster1.xml><?xml version="1.0" encoding="utf-8"?>
@@ -197,6 +336,7 @@
           <a:p>
             <a:fld id="{0F9B84EA-7D68-4D60-9CB1-D50884785D1C}" type="datetimeFigureOut">
               <a:rPr lang="zh-CN" altLang="en-US" smtClean="0"/>
+              <a:t>2022/5/21</a:t>
             </a:fld>
             <a:endParaRPr lang="zh-CN" altLang="en-US"/>
           </a:p>
@@ -262,12 +402,18 @@
           <a:p>
             <a:fld id="{8D4E0FC9-F1F8-4FAE-9988-3BA365CFD46F}" type="slidenum">
               <a:rPr lang="zh-CN" altLang="en-US" smtClean="0"/>
+              <a:t>‹#›</a:t>
             </a:fld>
             <a:endParaRPr lang="zh-CN" altLang="en-US"/>
           </a:p>
         </p:txBody>
       </p:sp>
     </p:spTree>
+    <p:extLst>
+      <p:ext uri="{BB962C8B-B14F-4D97-AF65-F5344CB8AC3E}">
+        <p14:creationId xmlns:p14="http://schemas.microsoft.com/office/powerpoint/2010/main" val="1"/>
+      </p:ext>
+    </p:extLst>
   </p:cSld>
   <p:clrMap bg1="lt1" tx1="dk1" bg2="lt2" tx2="dk2" accent1="accent1" accent2="accent2" accent3="accent3" accent4="accent4" accent5="accent5" accent6="accent6" hlink="hlink" folHlink="folHlink"/>
 </p:handoutMaster>
@@ -355,6 +501,7 @@
           <a:p>
             <a:fld id="{7B4F2CEB-5DF7-4808-8224-1EF646B93121}" type="datetimeFigureOut">
               <a:rPr lang="zh-CN" altLang="en-US" smtClean="0"/>
+              <a:t>2022/5/21</a:t>
             </a:fld>
             <a:endParaRPr lang="zh-CN" altLang="en-US"/>
           </a:p>
@@ -421,7 +568,6 @@
               <a:rPr lang="zh-CN" altLang="en-US"/>
               <a:t>单击此处编辑母版文本样式</a:t>
             </a:r>
-            <a:endParaRPr lang="zh-CN" altLang="en-US"/>
           </a:p>
           <a:p>
             <a:pPr lvl="1"/>
@@ -429,7 +575,6 @@
               <a:rPr lang="zh-CN" altLang="en-US"/>
               <a:t>二级</a:t>
             </a:r>
-            <a:endParaRPr lang="zh-CN" altLang="en-US"/>
           </a:p>
           <a:p>
             <a:pPr lvl="2"/>
@@ -437,7 +582,6 @@
               <a:rPr lang="zh-CN" altLang="en-US"/>
               <a:t>三级</a:t>
             </a:r>
-            <a:endParaRPr lang="zh-CN" altLang="en-US"/>
           </a:p>
           <a:p>
             <a:pPr lvl="3"/>
@@ -445,7 +589,6 @@
               <a:rPr lang="zh-CN" altLang="en-US"/>
               <a:t>四级</a:t>
             </a:r>
-            <a:endParaRPr lang="zh-CN" altLang="en-US"/>
           </a:p>
           <a:p>
             <a:pPr lvl="4"/>
@@ -453,7 +596,6 @@
               <a:rPr lang="zh-CN" altLang="en-US"/>
               <a:t>五级</a:t>
             </a:r>
-            <a:endParaRPr lang="zh-CN" altLang="en-US"/>
           </a:p>
         </p:txBody>
       </p:sp>
@@ -517,6 +659,7 @@
           <a:p>
             <a:fld id="{83AA1F61-0992-4120-A1E9-FA3A21BB776E}" type="slidenum">
               <a:rPr lang="zh-CN" altLang="en-US" smtClean="0"/>
+              <a:t>‹#›</a:t>
             </a:fld>
             <a:endParaRPr lang="zh-CN" altLang="en-US"/>
           </a:p>
@@ -721,7 +864,6 @@
               <a:rPr lang="zh-CN" altLang="en-US" dirty="0"/>
               <a:t>单击此处编辑母版标题样式</a:t>
             </a:r>
-            <a:endParaRPr lang="zh-CN" altLang="en-US" dirty="0"/>
           </a:p>
         </p:txBody>
       </p:sp>
@@ -786,7 +928,6 @@
               <a:rPr lang="zh-CN" altLang="en-US"/>
               <a:t>单击此处编辑母版副标题样式</a:t>
             </a:r>
-            <a:endParaRPr lang="zh-CN" altLang="en-US"/>
           </a:p>
         </p:txBody>
       </p:sp>
@@ -807,6 +948,7 @@
           <a:p>
             <a:fld id="{A9482DDB-C4B4-4602-831B-33D7CA22852C}" type="datetime1">
               <a:rPr lang="zh-CN" altLang="en-US" smtClean="0"/>
+              <a:t>2022/5/21</a:t>
             </a:fld>
             <a:endParaRPr lang="zh-CN" altLang="en-US"/>
           </a:p>
@@ -855,6 +997,7 @@
           <a:p>
             <a:fld id="{519AEA81-C1FD-4B2C-87D1-3FA637539CC6}" type="slidenum">
               <a:rPr lang="zh-CN" altLang="en-US" smtClean="0"/>
+              <a:t>‹#›</a:t>
             </a:fld>
             <a:endParaRPr lang="zh-CN" altLang="en-US" dirty="0"/>
           </a:p>
@@ -904,7 +1047,6 @@
               <a:rPr lang="zh-CN" altLang="en-US"/>
               <a:t>单击此处编辑母版标题样式</a:t>
             </a:r>
-            <a:endParaRPr lang="zh-CN" altLang="en-US"/>
           </a:p>
         </p:txBody>
       </p:sp>
@@ -928,7 +1070,6 @@
               <a:rPr lang="zh-CN" altLang="en-US"/>
               <a:t>单击此处编辑母版文本样式</a:t>
             </a:r>
-            <a:endParaRPr lang="zh-CN" altLang="en-US"/>
           </a:p>
           <a:p>
             <a:pPr lvl="1"/>
@@ -936,7 +1077,6 @@
               <a:rPr lang="zh-CN" altLang="en-US"/>
               <a:t>二级</a:t>
             </a:r>
-            <a:endParaRPr lang="zh-CN" altLang="en-US"/>
           </a:p>
           <a:p>
             <a:pPr lvl="2"/>
@@ -944,7 +1084,6 @@
               <a:rPr lang="zh-CN" altLang="en-US"/>
               <a:t>三级</a:t>
             </a:r>
-            <a:endParaRPr lang="zh-CN" altLang="en-US"/>
           </a:p>
           <a:p>
             <a:pPr lvl="3"/>
@@ -952,7 +1091,6 @@
               <a:rPr lang="zh-CN" altLang="en-US"/>
               <a:t>四级</a:t>
             </a:r>
-            <a:endParaRPr lang="zh-CN" altLang="en-US"/>
           </a:p>
           <a:p>
             <a:pPr lvl="4"/>
@@ -960,7 +1098,6 @@
               <a:rPr lang="zh-CN" altLang="en-US"/>
               <a:t>五级</a:t>
             </a:r>
-            <a:endParaRPr lang="zh-CN" altLang="en-US"/>
           </a:p>
         </p:txBody>
       </p:sp>
@@ -981,6 +1118,7 @@
           <a:p>
             <a:fld id="{E9B53CE2-FC60-405A-858E-53FC0D5D5173}" type="datetime1">
               <a:rPr lang="zh-CN" altLang="en-US" smtClean="0"/>
+              <a:t>2022/5/21</a:t>
             </a:fld>
             <a:endParaRPr lang="zh-CN" altLang="en-US"/>
           </a:p>
@@ -1022,6 +1160,7 @@
           <a:p>
             <a:fld id="{519AEA81-C1FD-4B2C-87D1-3FA637539CC6}" type="slidenum">
               <a:rPr lang="zh-CN" altLang="en-US" smtClean="0"/>
+              <a:t>‹#›</a:t>
             </a:fld>
             <a:endParaRPr lang="zh-CN" altLang="en-US"/>
           </a:p>
@@ -1076,7 +1215,6 @@
               <a:rPr lang="zh-CN" altLang="en-US"/>
               <a:t>单击此处编辑母版标题样式</a:t>
             </a:r>
-            <a:endParaRPr lang="zh-CN" altLang="en-US"/>
           </a:p>
         </p:txBody>
       </p:sp>
@@ -1105,7 +1243,6 @@
               <a:rPr lang="zh-CN" altLang="en-US"/>
               <a:t>单击此处编辑母版文本样式</a:t>
             </a:r>
-            <a:endParaRPr lang="zh-CN" altLang="en-US"/>
           </a:p>
           <a:p>
             <a:pPr lvl="1"/>
@@ -1113,7 +1250,6 @@
               <a:rPr lang="zh-CN" altLang="en-US"/>
               <a:t>二级</a:t>
             </a:r>
-            <a:endParaRPr lang="zh-CN" altLang="en-US"/>
           </a:p>
           <a:p>
             <a:pPr lvl="2"/>
@@ -1121,7 +1257,6 @@
               <a:rPr lang="zh-CN" altLang="en-US"/>
               <a:t>三级</a:t>
             </a:r>
-            <a:endParaRPr lang="zh-CN" altLang="en-US"/>
           </a:p>
           <a:p>
             <a:pPr lvl="3"/>
@@ -1129,7 +1264,6 @@
               <a:rPr lang="zh-CN" altLang="en-US"/>
               <a:t>四级</a:t>
             </a:r>
-            <a:endParaRPr lang="zh-CN" altLang="en-US"/>
           </a:p>
           <a:p>
             <a:pPr lvl="4"/>
@@ -1137,7 +1271,6 @@
               <a:rPr lang="zh-CN" altLang="en-US"/>
               <a:t>五级</a:t>
             </a:r>
-            <a:endParaRPr lang="zh-CN" altLang="en-US"/>
           </a:p>
         </p:txBody>
       </p:sp>
@@ -1158,6 +1291,7 @@
           <a:p>
             <a:fld id="{2C0097D1-6629-49F3-8447-AFCF4DA4A258}" type="datetime1">
               <a:rPr lang="zh-CN" altLang="en-US" smtClean="0"/>
+              <a:t>2022/5/21</a:t>
             </a:fld>
             <a:endParaRPr lang="zh-CN" altLang="en-US"/>
           </a:p>
@@ -1199,6 +1333,7 @@
           <a:p>
             <a:fld id="{519AEA81-C1FD-4B2C-87D1-3FA637539CC6}" type="slidenum">
               <a:rPr lang="zh-CN" altLang="en-US" smtClean="0"/>
+              <a:t>‹#›</a:t>
             </a:fld>
             <a:endParaRPr lang="zh-CN" altLang="en-US"/>
           </a:p>
@@ -1248,7 +1383,6 @@
               <a:rPr lang="zh-CN" altLang="en-US"/>
               <a:t>单击此处编辑母版标题样式</a:t>
             </a:r>
-            <a:endParaRPr lang="zh-CN" altLang="en-US"/>
           </a:p>
         </p:txBody>
       </p:sp>
@@ -1272,7 +1406,6 @@
               <a:rPr lang="zh-CN" altLang="en-US"/>
               <a:t>单击此处编辑母版文本样式</a:t>
             </a:r>
-            <a:endParaRPr lang="zh-CN" altLang="en-US"/>
           </a:p>
           <a:p>
             <a:pPr lvl="1"/>
@@ -1280,7 +1413,6 @@
               <a:rPr lang="zh-CN" altLang="en-US"/>
               <a:t>二级</a:t>
             </a:r>
-            <a:endParaRPr lang="zh-CN" altLang="en-US"/>
           </a:p>
           <a:p>
             <a:pPr lvl="2"/>
@@ -1288,7 +1420,6 @@
               <a:rPr lang="zh-CN" altLang="en-US"/>
               <a:t>三级</a:t>
             </a:r>
-            <a:endParaRPr lang="zh-CN" altLang="en-US"/>
           </a:p>
           <a:p>
             <a:pPr lvl="3"/>
@@ -1296,7 +1427,6 @@
               <a:rPr lang="zh-CN" altLang="en-US"/>
               <a:t>四级</a:t>
             </a:r>
-            <a:endParaRPr lang="zh-CN" altLang="en-US"/>
           </a:p>
           <a:p>
             <a:pPr lvl="4"/>
@@ -1304,7 +1434,6 @@
               <a:rPr lang="zh-CN" altLang="en-US"/>
               <a:t>五级</a:t>
             </a:r>
-            <a:endParaRPr lang="zh-CN" altLang="en-US"/>
           </a:p>
         </p:txBody>
       </p:sp>
@@ -1325,6 +1454,7 @@
           <a:p>
             <a:fld id="{91C93C8A-D80A-4DE1-A999-215FD607DBE3}" type="datetime1">
               <a:rPr lang="zh-CN" altLang="en-US" smtClean="0"/>
+              <a:t>2022/5/21</a:t>
             </a:fld>
             <a:endParaRPr lang="zh-CN" altLang="en-US"/>
           </a:p>
@@ -1366,6 +1496,7 @@
           <a:p>
             <a:fld id="{519AEA81-C1FD-4B2C-87D1-3FA637539CC6}" type="slidenum">
               <a:rPr lang="zh-CN" altLang="en-US" smtClean="0"/>
+              <a:t>‹#›</a:t>
             </a:fld>
             <a:endParaRPr lang="zh-CN" altLang="en-US" dirty="0"/>
           </a:p>
@@ -1427,7 +1558,6 @@
               <a:rPr lang="zh-CN" altLang="en-US" dirty="0"/>
               <a:t>单击此处编辑母版标题样式</a:t>
             </a:r>
-            <a:endParaRPr lang="zh-CN" altLang="en-US" dirty="0"/>
           </a:p>
         </p:txBody>
       </p:sp>
@@ -1547,7 +1677,6 @@
               <a:rPr lang="zh-CN" altLang="en-US" dirty="0"/>
               <a:t>单击此处编辑母版文本样式</a:t>
             </a:r>
-            <a:endParaRPr lang="zh-CN" altLang="en-US" dirty="0"/>
           </a:p>
         </p:txBody>
       </p:sp>
@@ -1568,6 +1697,7 @@
           <a:p>
             <a:fld id="{1B426F48-097D-4E21-B763-D29753566D82}" type="datetime1">
               <a:rPr lang="zh-CN" altLang="en-US" smtClean="0"/>
+              <a:t>2022/5/21</a:t>
             </a:fld>
             <a:endParaRPr lang="zh-CN" altLang="en-US"/>
           </a:p>
@@ -1609,6 +1739,7 @@
           <a:p>
             <a:fld id="{519AEA81-C1FD-4B2C-87D1-3FA637539CC6}" type="slidenum">
               <a:rPr lang="zh-CN" altLang="en-US" smtClean="0"/>
+              <a:t>‹#›</a:t>
             </a:fld>
             <a:endParaRPr lang="zh-CN" altLang="en-US"/>
           </a:p>
@@ -1658,7 +1789,6 @@
               <a:rPr lang="zh-CN" altLang="en-US"/>
               <a:t>单击此处编辑母版标题样式</a:t>
             </a:r>
-            <a:endParaRPr lang="zh-CN" altLang="en-US"/>
           </a:p>
         </p:txBody>
       </p:sp>
@@ -1687,7 +1817,6 @@
               <a:rPr lang="zh-CN" altLang="en-US"/>
               <a:t>单击此处编辑母版文本样式</a:t>
             </a:r>
-            <a:endParaRPr lang="zh-CN" altLang="en-US"/>
           </a:p>
           <a:p>
             <a:pPr lvl="1"/>
@@ -1695,7 +1824,6 @@
               <a:rPr lang="zh-CN" altLang="en-US"/>
               <a:t>二级</a:t>
             </a:r>
-            <a:endParaRPr lang="zh-CN" altLang="en-US"/>
           </a:p>
           <a:p>
             <a:pPr lvl="2"/>
@@ -1703,7 +1831,6 @@
               <a:rPr lang="zh-CN" altLang="en-US"/>
               <a:t>三级</a:t>
             </a:r>
-            <a:endParaRPr lang="zh-CN" altLang="en-US"/>
           </a:p>
           <a:p>
             <a:pPr lvl="3"/>
@@ -1711,7 +1838,6 @@
               <a:rPr lang="zh-CN" altLang="en-US"/>
               <a:t>四级</a:t>
             </a:r>
-            <a:endParaRPr lang="zh-CN" altLang="en-US"/>
           </a:p>
           <a:p>
             <a:pPr lvl="4"/>
@@ -1719,7 +1845,6 @@
               <a:rPr lang="zh-CN" altLang="en-US"/>
               <a:t>五级</a:t>
             </a:r>
-            <a:endParaRPr lang="zh-CN" altLang="en-US"/>
           </a:p>
         </p:txBody>
       </p:sp>
@@ -1748,7 +1873,6 @@
               <a:rPr lang="zh-CN" altLang="en-US"/>
               <a:t>单击此处编辑母版文本样式</a:t>
             </a:r>
-            <a:endParaRPr lang="zh-CN" altLang="en-US"/>
           </a:p>
           <a:p>
             <a:pPr lvl="1"/>
@@ -1756,7 +1880,6 @@
               <a:rPr lang="zh-CN" altLang="en-US"/>
               <a:t>二级</a:t>
             </a:r>
-            <a:endParaRPr lang="zh-CN" altLang="en-US"/>
           </a:p>
           <a:p>
             <a:pPr lvl="2"/>
@@ -1764,7 +1887,6 @@
               <a:rPr lang="zh-CN" altLang="en-US"/>
               <a:t>三级</a:t>
             </a:r>
-            <a:endParaRPr lang="zh-CN" altLang="en-US"/>
           </a:p>
           <a:p>
             <a:pPr lvl="3"/>
@@ -1772,7 +1894,6 @@
               <a:rPr lang="zh-CN" altLang="en-US"/>
               <a:t>四级</a:t>
             </a:r>
-            <a:endParaRPr lang="zh-CN" altLang="en-US"/>
           </a:p>
           <a:p>
             <a:pPr lvl="4"/>
@@ -1780,7 +1901,6 @@
               <a:rPr lang="zh-CN" altLang="en-US"/>
               <a:t>五级</a:t>
             </a:r>
-            <a:endParaRPr lang="zh-CN" altLang="en-US"/>
           </a:p>
         </p:txBody>
       </p:sp>
@@ -1801,6 +1921,7 @@
           <a:p>
             <a:fld id="{493A7B37-EF3E-4286-9A7A-8A71F864A976}" type="datetime1">
               <a:rPr lang="zh-CN" altLang="en-US" smtClean="0"/>
+              <a:t>2022/5/21</a:t>
             </a:fld>
             <a:endParaRPr lang="zh-CN" altLang="en-US"/>
           </a:p>
@@ -1842,6 +1963,7 @@
           <a:p>
             <a:fld id="{519AEA81-C1FD-4B2C-87D1-3FA637539CC6}" type="slidenum">
               <a:rPr lang="zh-CN" altLang="en-US" smtClean="0"/>
+              <a:t>‹#›</a:t>
             </a:fld>
             <a:endParaRPr lang="zh-CN" altLang="en-US"/>
           </a:p>
@@ -1896,7 +2018,6 @@
               <a:rPr lang="zh-CN" altLang="en-US"/>
               <a:t>单击此处编辑母版标题样式</a:t>
             </a:r>
-            <a:endParaRPr lang="zh-CN" altLang="en-US"/>
           </a:p>
         </p:txBody>
       </p:sp>
@@ -1962,7 +2083,6 @@
               <a:rPr lang="zh-CN" altLang="en-US"/>
               <a:t>单击此处编辑母版文本样式</a:t>
             </a:r>
-            <a:endParaRPr lang="zh-CN" altLang="en-US"/>
           </a:p>
         </p:txBody>
       </p:sp>
@@ -1991,7 +2111,6 @@
               <a:rPr lang="zh-CN" altLang="en-US"/>
               <a:t>单击此处编辑母版文本样式</a:t>
             </a:r>
-            <a:endParaRPr lang="zh-CN" altLang="en-US"/>
           </a:p>
           <a:p>
             <a:pPr lvl="1"/>
@@ -1999,7 +2118,6 @@
               <a:rPr lang="zh-CN" altLang="en-US"/>
               <a:t>二级</a:t>
             </a:r>
-            <a:endParaRPr lang="zh-CN" altLang="en-US"/>
           </a:p>
           <a:p>
             <a:pPr lvl="2"/>
@@ -2007,7 +2125,6 @@
               <a:rPr lang="zh-CN" altLang="en-US"/>
               <a:t>三级</a:t>
             </a:r>
-            <a:endParaRPr lang="zh-CN" altLang="en-US"/>
           </a:p>
           <a:p>
             <a:pPr lvl="3"/>
@@ -2015,7 +2132,6 @@
               <a:rPr lang="zh-CN" altLang="en-US"/>
               <a:t>四级</a:t>
             </a:r>
-            <a:endParaRPr lang="zh-CN" altLang="en-US"/>
           </a:p>
           <a:p>
             <a:pPr lvl="4"/>
@@ -2023,7 +2139,6 @@
               <a:rPr lang="zh-CN" altLang="en-US"/>
               <a:t>五级</a:t>
             </a:r>
-            <a:endParaRPr lang="zh-CN" altLang="en-US"/>
           </a:p>
         </p:txBody>
       </p:sp>
@@ -2089,7 +2204,6 @@
               <a:rPr lang="zh-CN" altLang="en-US"/>
               <a:t>单击此处编辑母版文本样式</a:t>
             </a:r>
-            <a:endParaRPr lang="zh-CN" altLang="en-US"/>
           </a:p>
         </p:txBody>
       </p:sp>
@@ -2118,7 +2232,6 @@
               <a:rPr lang="zh-CN" altLang="en-US"/>
               <a:t>单击此处编辑母版文本样式</a:t>
             </a:r>
-            <a:endParaRPr lang="zh-CN" altLang="en-US"/>
           </a:p>
           <a:p>
             <a:pPr lvl="1"/>
@@ -2126,7 +2239,6 @@
               <a:rPr lang="zh-CN" altLang="en-US"/>
               <a:t>二级</a:t>
             </a:r>
-            <a:endParaRPr lang="zh-CN" altLang="en-US"/>
           </a:p>
           <a:p>
             <a:pPr lvl="2"/>
@@ -2134,7 +2246,6 @@
               <a:rPr lang="zh-CN" altLang="en-US"/>
               <a:t>三级</a:t>
             </a:r>
-            <a:endParaRPr lang="zh-CN" altLang="en-US"/>
           </a:p>
           <a:p>
             <a:pPr lvl="3"/>
@@ -2142,7 +2253,6 @@
               <a:rPr lang="zh-CN" altLang="en-US"/>
               <a:t>四级</a:t>
             </a:r>
-            <a:endParaRPr lang="zh-CN" altLang="en-US"/>
           </a:p>
           <a:p>
             <a:pPr lvl="4"/>
@@ -2150,7 +2260,6 @@
               <a:rPr lang="zh-CN" altLang="en-US"/>
               <a:t>五级</a:t>
             </a:r>
-            <a:endParaRPr lang="zh-CN" altLang="en-US"/>
           </a:p>
         </p:txBody>
       </p:sp>
@@ -2171,6 +2280,7 @@
           <a:p>
             <a:fld id="{EE865B14-2060-46DE-8771-7F348C538412}" type="datetime1">
               <a:rPr lang="zh-CN" altLang="en-US" smtClean="0"/>
+              <a:t>2022/5/21</a:t>
             </a:fld>
             <a:endParaRPr lang="zh-CN" altLang="en-US"/>
           </a:p>
@@ -2212,6 +2322,7 @@
           <a:p>
             <a:fld id="{519AEA81-C1FD-4B2C-87D1-3FA637539CC6}" type="slidenum">
               <a:rPr lang="zh-CN" altLang="en-US" smtClean="0"/>
+              <a:t>‹#›</a:t>
             </a:fld>
             <a:endParaRPr lang="zh-CN" altLang="en-US"/>
           </a:p>
@@ -2261,7 +2372,6 @@
               <a:rPr lang="zh-CN" altLang="en-US"/>
               <a:t>单击此处编辑母版标题样式</a:t>
             </a:r>
-            <a:endParaRPr lang="zh-CN" altLang="en-US"/>
           </a:p>
         </p:txBody>
       </p:sp>
@@ -2282,6 +2392,7 @@
           <a:p>
             <a:fld id="{85AF00BA-1A83-449D-8AEA-1E736981FE20}" type="datetime1">
               <a:rPr lang="zh-CN" altLang="en-US" smtClean="0"/>
+              <a:t>2022/5/21</a:t>
             </a:fld>
             <a:endParaRPr lang="zh-CN" altLang="en-US"/>
           </a:p>
@@ -2323,6 +2434,7 @@
           <a:p>
             <a:fld id="{519AEA81-C1FD-4B2C-87D1-3FA637539CC6}" type="slidenum">
               <a:rPr lang="zh-CN" altLang="en-US" smtClean="0"/>
+              <a:t>‹#›</a:t>
             </a:fld>
             <a:endParaRPr lang="zh-CN" altLang="en-US"/>
           </a:p>
@@ -2370,6 +2482,7 @@
           <a:p>
             <a:fld id="{65F816BB-10C1-4E24-9BB7-3D382288F272}" type="datetime1">
               <a:rPr lang="zh-CN" altLang="en-US" smtClean="0"/>
+              <a:t>2022/5/21</a:t>
             </a:fld>
             <a:endParaRPr lang="zh-CN" altLang="en-US"/>
           </a:p>
@@ -2411,6 +2524,7 @@
           <a:p>
             <a:fld id="{519AEA81-C1FD-4B2C-87D1-3FA637539CC6}" type="slidenum">
               <a:rPr lang="zh-CN" altLang="en-US" smtClean="0"/>
+              <a:t>‹#›</a:t>
             </a:fld>
             <a:endParaRPr lang="zh-CN" altLang="en-US"/>
           </a:p>
@@ -2469,7 +2583,6 @@
               <a:rPr lang="zh-CN" altLang="en-US"/>
               <a:t>单击此处编辑母版标题样式</a:t>
             </a:r>
-            <a:endParaRPr lang="zh-CN" altLang="en-US"/>
           </a:p>
         </p:txBody>
       </p:sp>
@@ -2526,7 +2639,6 @@
               <a:rPr lang="zh-CN" altLang="en-US"/>
               <a:t>单击此处编辑母版文本样式</a:t>
             </a:r>
-            <a:endParaRPr lang="zh-CN" altLang="en-US"/>
           </a:p>
           <a:p>
             <a:pPr lvl="1"/>
@@ -2534,7 +2646,6 @@
               <a:rPr lang="zh-CN" altLang="en-US"/>
               <a:t>二级</a:t>
             </a:r>
-            <a:endParaRPr lang="zh-CN" altLang="en-US"/>
           </a:p>
           <a:p>
             <a:pPr lvl="2"/>
@@ -2542,7 +2653,6 @@
               <a:rPr lang="zh-CN" altLang="en-US"/>
               <a:t>三级</a:t>
             </a:r>
-            <a:endParaRPr lang="zh-CN" altLang="en-US"/>
           </a:p>
           <a:p>
             <a:pPr lvl="3"/>
@@ -2550,7 +2660,6 @@
               <a:rPr lang="zh-CN" altLang="en-US"/>
               <a:t>四级</a:t>
             </a:r>
-            <a:endParaRPr lang="zh-CN" altLang="en-US"/>
           </a:p>
           <a:p>
             <a:pPr lvl="4"/>
@@ -2558,7 +2667,6 @@
               <a:rPr lang="zh-CN" altLang="en-US"/>
               <a:t>五级</a:t>
             </a:r>
-            <a:endParaRPr lang="zh-CN" altLang="en-US"/>
           </a:p>
         </p:txBody>
       </p:sp>
@@ -2624,7 +2732,6 @@
               <a:rPr lang="zh-CN" altLang="en-US"/>
               <a:t>单击此处编辑母版文本样式</a:t>
             </a:r>
-            <a:endParaRPr lang="zh-CN" altLang="en-US"/>
           </a:p>
         </p:txBody>
       </p:sp>
@@ -2645,6 +2752,7 @@
           <a:p>
             <a:fld id="{EDB3BA1B-C557-45E4-9C66-0434B6B2BC7D}" type="datetime1">
               <a:rPr lang="zh-CN" altLang="en-US" smtClean="0"/>
+              <a:t>2022/5/21</a:t>
             </a:fld>
             <a:endParaRPr lang="zh-CN" altLang="en-US"/>
           </a:p>
@@ -2686,6 +2794,7 @@
           <a:p>
             <a:fld id="{519AEA81-C1FD-4B2C-87D1-3FA637539CC6}" type="slidenum">
               <a:rPr lang="zh-CN" altLang="en-US" smtClean="0"/>
+              <a:t>‹#›</a:t>
             </a:fld>
             <a:endParaRPr lang="zh-CN" altLang="en-US"/>
           </a:p>
@@ -2744,7 +2853,6 @@
               <a:rPr lang="zh-CN" altLang="en-US"/>
               <a:t>单击此处编辑母版标题样式</a:t>
             </a:r>
-            <a:endParaRPr lang="zh-CN" altLang="en-US"/>
           </a:p>
         </p:txBody>
       </p:sp>
@@ -2871,7 +2979,6 @@
               <a:rPr lang="zh-CN" altLang="en-US"/>
               <a:t>单击此处编辑母版文本样式</a:t>
             </a:r>
-            <a:endParaRPr lang="zh-CN" altLang="en-US"/>
           </a:p>
         </p:txBody>
       </p:sp>
@@ -2892,6 +2999,7 @@
           <a:p>
             <a:fld id="{1940BD16-E0DE-4D56-BE59-0FECC58F0719}" type="datetime1">
               <a:rPr lang="zh-CN" altLang="en-US" smtClean="0"/>
+              <a:t>2022/5/21</a:t>
             </a:fld>
             <a:endParaRPr lang="zh-CN" altLang="en-US"/>
           </a:p>
@@ -2933,6 +3041,7 @@
           <a:p>
             <a:fld id="{519AEA81-C1FD-4B2C-87D1-3FA637539CC6}" type="slidenum">
               <a:rPr lang="zh-CN" altLang="en-US" smtClean="0"/>
+              <a:t>‹#›</a:t>
             </a:fld>
             <a:endParaRPr lang="zh-CN" altLang="en-US"/>
           </a:p>
@@ -2997,7 +3106,6 @@
               <a:rPr lang="zh-CN" altLang="en-US" dirty="0"/>
               <a:t>单击此处编辑母版标题样式</a:t>
             </a:r>
-            <a:endParaRPr lang="zh-CN" altLang="en-US" dirty="0"/>
           </a:p>
         </p:txBody>
       </p:sp>
@@ -3031,7 +3139,6 @@
               <a:rPr lang="zh-CN" altLang="en-US" dirty="0"/>
               <a:t>单击此处编辑母版文本样式</a:t>
             </a:r>
-            <a:endParaRPr lang="zh-CN" altLang="en-US" dirty="0"/>
           </a:p>
           <a:p>
             <a:pPr lvl="1"/>
@@ -3039,7 +3146,6 @@
               <a:rPr lang="zh-CN" altLang="en-US" dirty="0"/>
               <a:t>二级</a:t>
             </a:r>
-            <a:endParaRPr lang="zh-CN" altLang="en-US" dirty="0"/>
           </a:p>
           <a:p>
             <a:pPr lvl="2"/>
@@ -3047,7 +3153,6 @@
               <a:rPr lang="zh-CN" altLang="en-US" dirty="0"/>
               <a:t>三级</a:t>
             </a:r>
-            <a:endParaRPr lang="zh-CN" altLang="en-US" dirty="0"/>
           </a:p>
           <a:p>
             <a:pPr lvl="3"/>
@@ -3055,7 +3160,6 @@
               <a:rPr lang="zh-CN" altLang="en-US" dirty="0"/>
               <a:t>四级</a:t>
             </a:r>
-            <a:endParaRPr lang="zh-CN" altLang="en-US" dirty="0"/>
           </a:p>
           <a:p>
             <a:pPr lvl="4"/>
@@ -3063,7 +3167,6 @@
               <a:rPr lang="zh-CN" altLang="en-US" dirty="0"/>
               <a:t>五级</a:t>
             </a:r>
-            <a:endParaRPr lang="zh-CN" altLang="en-US" dirty="0"/>
           </a:p>
         </p:txBody>
       </p:sp>
@@ -3102,6 +3205,7 @@
           <a:p>
             <a:fld id="{A1C7E667-A427-4A7F-A6E1-89474718F88F}" type="datetime1">
               <a:rPr lang="zh-CN" altLang="en-US" smtClean="0"/>
+              <a:t>2022/5/21</a:t>
             </a:fld>
             <a:endParaRPr lang="zh-CN" altLang="en-US"/>
           </a:p>
@@ -3179,6 +3283,7 @@
           <a:p>
             <a:fld id="{519AEA81-C1FD-4B2C-87D1-3FA637539CC6}" type="slidenum">
               <a:rPr lang="zh-CN" altLang="en-US" smtClean="0"/>
+              <a:t>‹#›</a:t>
             </a:fld>
             <a:endParaRPr lang="zh-CN" altLang="en-US"/>
           </a:p>
@@ -3574,7 +3679,6 @@
               <a:rPr lang="zh-CN" altLang="en-US" dirty="0"/>
               <a:t>进度汇报</a:t>
             </a:r>
-            <a:endParaRPr lang="zh-CN" altLang="en-US" dirty="0"/>
           </a:p>
         </p:txBody>
       </p:sp>
@@ -3597,7 +3701,6 @@
               <a:rPr lang="zh-CN" altLang="en-US" dirty="0"/>
               <a:t>刘松铭 于子淳</a:t>
             </a:r>
-            <a:endParaRPr lang="zh-CN" altLang="en-US" dirty="0"/>
           </a:p>
         </p:txBody>
       </p:sp>
@@ -3618,6 +3721,7 @@
           <a:p>
             <a:fld id="{519AEA81-C1FD-4B2C-87D1-3FA637539CC6}" type="slidenum">
               <a:rPr lang="zh-CN" altLang="en-US" smtClean="0"/>
+              <a:t>1</a:t>
             </a:fld>
             <a:endParaRPr lang="zh-CN" altLang="en-US" dirty="0"/>
           </a:p>
@@ -3667,7 +3771,6 @@
               <a:rPr lang="zh-CN" altLang="en-US" dirty="0"/>
               <a:t>进度汇报</a:t>
             </a:r>
-            <a:endParaRPr lang="zh-CN" altLang="en-US" dirty="0"/>
           </a:p>
         </p:txBody>
       </p:sp>
@@ -3697,7 +3800,6 @@
               <a:rPr lang="zh-CN" altLang="en-US" dirty="0"/>
               <a:t>于子淳</a:t>
             </a:r>
-            <a:endParaRPr lang="zh-CN" altLang="en-US" dirty="0"/>
           </a:p>
           <a:p>
             <a:r>
@@ -3708,7 +3810,6 @@
               <a:rPr lang="zh-CN" altLang="en-US" dirty="0"/>
               <a:t>分支</a:t>
             </a:r>
-            <a:endParaRPr lang="zh-CN" altLang="en-US" dirty="0"/>
           </a:p>
           <a:p>
             <a:pPr lvl="1"/>
@@ -3742,9 +3843,6 @@
               </a:rPr>
               <a:t>到主分支</a:t>
             </a:r>
-            <a:endParaRPr lang="zh-CN" altLang="en-US" dirty="0">
-              <a:sym typeface="+mn-ea"/>
-            </a:endParaRPr>
           </a:p>
           <a:p>
             <a:pPr lvl="1"/>
@@ -3802,6 +3900,7 @@
           <a:p>
             <a:fld id="{519AEA81-C1FD-4B2C-87D1-3FA637539CC6}" type="slidenum">
               <a:rPr lang="zh-CN" altLang="en-US" smtClean="0"/>
+              <a:t>2</a:t>
             </a:fld>
             <a:endParaRPr lang="zh-CN" altLang="en-US" dirty="0"/>
           </a:p>
@@ -3834,6 +3933,664 @@
       </p:grpSpPr>
       <p:sp>
         <p:nvSpPr>
+          <p:cNvPr id="2" name="标题 1">
+            <a:extLst>
+              <a:ext uri="{FF2B5EF4-FFF2-40B4-BE49-F238E27FC236}">
+                <a16:creationId xmlns:a16="http://schemas.microsoft.com/office/drawing/2014/main" id="{606FBA64-85B3-0BC3-589B-CF813B34D88F}"/>
+              </a:ext>
+            </a:extLst>
+          </p:cNvPr>
+          <p:cNvSpPr>
+            <a:spLocks noGrp="1"/>
+          </p:cNvSpPr>
+          <p:nvPr>
+            <p:ph type="title"/>
+          </p:nvPr>
+        </p:nvSpPr>
+        <p:spPr/>
+        <p:txBody>
+          <a:bodyPr/>
+          <a:lstStyle/>
+          <a:p>
+            <a:r>
+              <a:rPr lang="zh-CN" altLang="en-US" dirty="0"/>
+              <a:t>进度汇报</a:t>
+            </a:r>
+          </a:p>
+        </p:txBody>
+      </p:sp>
+      <p:sp>
+        <p:nvSpPr>
+          <p:cNvPr id="3" name="内容占位符 2">
+            <a:extLst>
+              <a:ext uri="{FF2B5EF4-FFF2-40B4-BE49-F238E27FC236}">
+                <a16:creationId xmlns:a16="http://schemas.microsoft.com/office/drawing/2014/main" id="{C667B299-2EB9-832E-FFAC-7E0F0D10C01F}"/>
+              </a:ext>
+            </a:extLst>
+          </p:cNvPr>
+          <p:cNvSpPr>
+            <a:spLocks noGrp="1"/>
+          </p:cNvSpPr>
+          <p:nvPr>
+            <p:ph idx="1"/>
+          </p:nvPr>
+        </p:nvSpPr>
+        <p:spPr/>
+        <p:txBody>
+          <a:bodyPr/>
+          <a:lstStyle/>
+          <a:p>
+            <a:r>
+              <a:rPr lang="zh-CN" altLang="en-US" dirty="0"/>
+              <a:t>刘松铭</a:t>
+            </a:r>
+            <a:endParaRPr lang="en-US" altLang="zh-CN" dirty="0"/>
+          </a:p>
+          <a:p>
+            <a:r>
+              <a:rPr lang="en-US" altLang="zh-CN" dirty="0" err="1"/>
+              <a:t>BitAllocator</a:t>
+            </a:r>
+            <a:r>
+              <a:rPr lang="zh-CN" altLang="en-US" dirty="0"/>
+              <a:t>的</a:t>
+            </a:r>
+            <a:r>
+              <a:rPr lang="en-US" altLang="zh-CN" dirty="0"/>
+              <a:t>bug</a:t>
+            </a:r>
+            <a:r>
+              <a:rPr lang="zh-CN" altLang="en-US" dirty="0"/>
+              <a:t>已经解决</a:t>
+            </a:r>
+            <a:endParaRPr lang="en-US" altLang="zh-CN" dirty="0"/>
+          </a:p>
+          <a:p>
+            <a:r>
+              <a:rPr lang="en-US" altLang="zh-CN" dirty="0"/>
+              <a:t>U740</a:t>
+            </a:r>
+            <a:r>
+              <a:rPr lang="zh-CN" altLang="en-US" dirty="0"/>
+              <a:t>给的地址</a:t>
+            </a:r>
+            <a:r>
+              <a:rPr lang="en-US" altLang="zh-CN" dirty="0"/>
+              <a:t>0x83f5a000 - 0x100000000</a:t>
+            </a:r>
+          </a:p>
+          <a:p>
+            <a:r>
+              <a:rPr lang="en-US" altLang="zh-CN" dirty="0" err="1"/>
+              <a:t>BitAllocator</a:t>
+            </a:r>
+            <a:r>
+              <a:rPr lang="zh-CN" altLang="en-US" dirty="0"/>
+              <a:t>只给了</a:t>
+            </a:r>
+            <a:r>
+              <a:rPr lang="en-US" altLang="zh-CN" dirty="0"/>
+              <a:t>4G</a:t>
+            </a:r>
+            <a:r>
+              <a:rPr lang="zh-CN" altLang="en-US" dirty="0"/>
+              <a:t>的地址，发生越界</a:t>
+            </a:r>
+            <a:endParaRPr lang="en-US" altLang="zh-CN" dirty="0"/>
+          </a:p>
+          <a:p>
+            <a:r>
+              <a:rPr lang="zh-CN" altLang="en-US" dirty="0"/>
+              <a:t>目前通过修改编译选项来修改</a:t>
+            </a:r>
+          </a:p>
+        </p:txBody>
+      </p:sp>
+      <p:sp>
+        <p:nvSpPr>
+          <p:cNvPr id="4" name="灯片编号占位符 3">
+            <a:extLst>
+              <a:ext uri="{FF2B5EF4-FFF2-40B4-BE49-F238E27FC236}">
+                <a16:creationId xmlns:a16="http://schemas.microsoft.com/office/drawing/2014/main" id="{3A76F292-21BC-7EC6-1184-B37944F9DD10}"/>
+              </a:ext>
+            </a:extLst>
+          </p:cNvPr>
+          <p:cNvSpPr>
+            <a:spLocks noGrp="1"/>
+          </p:cNvSpPr>
+          <p:nvPr>
+            <p:ph type="sldNum" sz="quarter" idx="12"/>
+          </p:nvPr>
+        </p:nvSpPr>
+        <p:spPr/>
+        <p:txBody>
+          <a:bodyPr/>
+          <a:lstStyle/>
+          <a:p>
+            <a:fld id="{519AEA81-C1FD-4B2C-87D1-3FA637539CC6}" type="slidenum">
+              <a:rPr lang="zh-CN" altLang="en-US" smtClean="0"/>
+              <a:t>3</a:t>
+            </a:fld>
+            <a:endParaRPr lang="zh-CN" altLang="en-US" dirty="0"/>
+          </a:p>
+        </p:txBody>
+      </p:sp>
+    </p:spTree>
+    <p:extLst>
+      <p:ext uri="{BB962C8B-B14F-4D97-AF65-F5344CB8AC3E}">
+        <p14:creationId xmlns:p14="http://schemas.microsoft.com/office/powerpoint/2010/main" val="2188342295"/>
+      </p:ext>
+    </p:extLst>
+  </p:cSld>
+  <p:clrMapOvr>
+    <a:masterClrMapping/>
+  </p:clrMapOvr>
+</p:sld>
+</file>
+
+<file path=ppt/slides/slide4.xml><?xml version="1.0" encoding="utf-8"?>
+<p:sld xmlns:a="http://schemas.openxmlformats.org/drawingml/2006/main" xmlns:r="http://schemas.openxmlformats.org/officeDocument/2006/relationships" xmlns:p="http://schemas.openxmlformats.org/presentationml/2006/main">
+  <p:cSld>
+    <p:spTree>
+      <p:nvGrpSpPr>
+        <p:cNvPr id="1" name=""/>
+        <p:cNvGrpSpPr/>
+        <p:nvPr/>
+      </p:nvGrpSpPr>
+      <p:grpSpPr>
+        <a:xfrm>
+          <a:off x="0" y="0"/>
+          <a:ext cx="0" cy="0"/>
+          <a:chOff x="0" y="0"/>
+          <a:chExt cx="0" cy="0"/>
+        </a:xfrm>
+      </p:grpSpPr>
+      <p:sp>
+        <p:nvSpPr>
+          <p:cNvPr id="2" name="标题 1">
+            <a:extLst>
+              <a:ext uri="{FF2B5EF4-FFF2-40B4-BE49-F238E27FC236}">
+                <a16:creationId xmlns:a16="http://schemas.microsoft.com/office/drawing/2014/main" id="{2149C24B-DD32-F277-F8BB-BFE3F5B5C8FD}"/>
+              </a:ext>
+            </a:extLst>
+          </p:cNvPr>
+          <p:cNvSpPr>
+            <a:spLocks noGrp="1"/>
+          </p:cNvSpPr>
+          <p:nvPr>
+            <p:ph type="title"/>
+          </p:nvPr>
+        </p:nvSpPr>
+        <p:spPr/>
+        <p:txBody>
+          <a:bodyPr/>
+          <a:lstStyle/>
+          <a:p>
+            <a:r>
+              <a:rPr lang="zh-CN" altLang="en-US" dirty="0"/>
+              <a:t>目前问题</a:t>
+            </a:r>
+          </a:p>
+        </p:txBody>
+      </p:sp>
+      <p:sp>
+        <p:nvSpPr>
+          <p:cNvPr id="3" name="内容占位符 2">
+            <a:extLst>
+              <a:ext uri="{FF2B5EF4-FFF2-40B4-BE49-F238E27FC236}">
+                <a16:creationId xmlns:a16="http://schemas.microsoft.com/office/drawing/2014/main" id="{4244DD2A-53B1-F8DC-22F9-25FDEDE31D26}"/>
+              </a:ext>
+            </a:extLst>
+          </p:cNvPr>
+          <p:cNvSpPr>
+            <a:spLocks noGrp="1"/>
+          </p:cNvSpPr>
+          <p:nvPr>
+            <p:ph idx="1"/>
+          </p:nvPr>
+        </p:nvSpPr>
+        <p:spPr/>
+        <p:txBody>
+          <a:bodyPr/>
+          <a:lstStyle/>
+          <a:p>
+            <a:r>
+              <a:rPr lang="zh-CN" altLang="en-US" dirty="0"/>
+              <a:t>地址某些段不可访问，发生</a:t>
+            </a:r>
+            <a:r>
+              <a:rPr lang="en-US" altLang="zh-CN" dirty="0"/>
+              <a:t>page fault</a:t>
+            </a:r>
+          </a:p>
+          <a:p>
+            <a:r>
+              <a:rPr lang="zh-CN" altLang="en-US" dirty="0"/>
+              <a:t>怀疑是读取设备树或者是返回的可用地址出现了问题</a:t>
+            </a:r>
+            <a:endParaRPr lang="en-US" altLang="zh-CN" dirty="0"/>
+          </a:p>
+          <a:p>
+            <a:endParaRPr lang="zh-CN" altLang="en-US" dirty="0"/>
+          </a:p>
+        </p:txBody>
+      </p:sp>
+      <p:sp>
+        <p:nvSpPr>
+          <p:cNvPr id="4" name="灯片编号占位符 3">
+            <a:extLst>
+              <a:ext uri="{FF2B5EF4-FFF2-40B4-BE49-F238E27FC236}">
+                <a16:creationId xmlns:a16="http://schemas.microsoft.com/office/drawing/2014/main" id="{FEC5BAAD-FCDB-4CDF-C2D4-989FB0E8F9B3}"/>
+              </a:ext>
+            </a:extLst>
+          </p:cNvPr>
+          <p:cNvSpPr>
+            <a:spLocks noGrp="1"/>
+          </p:cNvSpPr>
+          <p:nvPr>
+            <p:ph type="sldNum" sz="quarter" idx="12"/>
+          </p:nvPr>
+        </p:nvSpPr>
+        <p:spPr/>
+        <p:txBody>
+          <a:bodyPr/>
+          <a:lstStyle/>
+          <a:p>
+            <a:fld id="{519AEA81-C1FD-4B2C-87D1-3FA637539CC6}" type="slidenum">
+              <a:rPr lang="zh-CN" altLang="en-US" smtClean="0"/>
+              <a:t>4</a:t>
+            </a:fld>
+            <a:endParaRPr lang="zh-CN" altLang="en-US" dirty="0"/>
+          </a:p>
+        </p:txBody>
+      </p:sp>
+      <p:pic>
+        <p:nvPicPr>
+          <p:cNvPr id="6" name="图片 5">
+            <a:extLst>
+              <a:ext uri="{FF2B5EF4-FFF2-40B4-BE49-F238E27FC236}">
+                <a16:creationId xmlns:a16="http://schemas.microsoft.com/office/drawing/2014/main" id="{12434913-078F-5E4C-775E-C507CBF6C8A1}"/>
+              </a:ext>
+            </a:extLst>
+          </p:cNvPr>
+          <p:cNvPicPr>
+            <a:picLocks noChangeAspect="1"/>
+          </p:cNvPicPr>
+          <p:nvPr/>
+        </p:nvPicPr>
+        <p:blipFill>
+          <a:blip r:embed="rId2">
+            <a:extLst>
+              <a:ext uri="{28A0092B-C50C-407E-A947-70E740481C1C}">
+                <a14:useLocalDpi xmlns:a14="http://schemas.microsoft.com/office/drawing/2010/main" val="0"/>
+              </a:ext>
+            </a:extLst>
+          </a:blip>
+          <a:stretch>
+            <a:fillRect/>
+          </a:stretch>
+        </p:blipFill>
+        <p:spPr>
+          <a:xfrm>
+            <a:off x="838200" y="3025455"/>
+            <a:ext cx="6279424" cy="3696020"/>
+          </a:xfrm>
+          <a:prstGeom prst="rect">
+            <a:avLst/>
+          </a:prstGeom>
+        </p:spPr>
+      </p:pic>
+    </p:spTree>
+    <p:extLst>
+      <p:ext uri="{BB962C8B-B14F-4D97-AF65-F5344CB8AC3E}">
+        <p14:creationId xmlns:p14="http://schemas.microsoft.com/office/powerpoint/2010/main" val="2526896225"/>
+      </p:ext>
+    </p:extLst>
+  </p:cSld>
+  <p:clrMapOvr>
+    <a:masterClrMapping/>
+  </p:clrMapOvr>
+</p:sld>
+</file>
+
+<file path=ppt/slides/slide5.xml><?xml version="1.0" encoding="utf-8"?>
+<p:sld xmlns:a="http://schemas.openxmlformats.org/drawingml/2006/main" xmlns:r="http://schemas.openxmlformats.org/officeDocument/2006/relationships" xmlns:p="http://schemas.openxmlformats.org/presentationml/2006/main">
+  <p:cSld>
+    <p:spTree>
+      <p:nvGrpSpPr>
+        <p:cNvPr id="1" name=""/>
+        <p:cNvGrpSpPr/>
+        <p:nvPr/>
+      </p:nvGrpSpPr>
+      <p:grpSpPr>
+        <a:xfrm>
+          <a:off x="0" y="0"/>
+          <a:ext cx="0" cy="0"/>
+          <a:chOff x="0" y="0"/>
+          <a:chExt cx="0" cy="0"/>
+        </a:xfrm>
+      </p:grpSpPr>
+      <p:sp>
+        <p:nvSpPr>
+          <p:cNvPr id="2" name="标题 1">
+            <a:extLst>
+              <a:ext uri="{FF2B5EF4-FFF2-40B4-BE49-F238E27FC236}">
+                <a16:creationId xmlns:a16="http://schemas.microsoft.com/office/drawing/2014/main" id="{8B96EE58-58BF-0E77-2A17-DEA21DD8F792}"/>
+              </a:ext>
+            </a:extLst>
+          </p:cNvPr>
+          <p:cNvSpPr>
+            <a:spLocks noGrp="1"/>
+          </p:cNvSpPr>
+          <p:nvPr>
+            <p:ph type="title"/>
+          </p:nvPr>
+        </p:nvSpPr>
+        <p:spPr/>
+        <p:txBody>
+          <a:bodyPr/>
+          <a:lstStyle/>
+          <a:p>
+            <a:r>
+              <a:rPr lang="zh-CN" altLang="en-US" dirty="0"/>
+              <a:t>目前问题</a:t>
+            </a:r>
+          </a:p>
+        </p:txBody>
+      </p:sp>
+      <p:sp>
+        <p:nvSpPr>
+          <p:cNvPr id="3" name="内容占位符 2">
+            <a:extLst>
+              <a:ext uri="{FF2B5EF4-FFF2-40B4-BE49-F238E27FC236}">
+                <a16:creationId xmlns:a16="http://schemas.microsoft.com/office/drawing/2014/main" id="{D35F3449-A7BA-6BE9-351A-4BCB264B0202}"/>
+              </a:ext>
+            </a:extLst>
+          </p:cNvPr>
+          <p:cNvSpPr>
+            <a:spLocks noGrp="1"/>
+          </p:cNvSpPr>
+          <p:nvPr>
+            <p:ph idx="1"/>
+          </p:nvPr>
+        </p:nvSpPr>
+        <p:spPr/>
+        <p:txBody>
+          <a:bodyPr/>
+          <a:lstStyle/>
+          <a:p>
+            <a:r>
+              <a:rPr lang="zh-CN" altLang="en-US" dirty="0"/>
+              <a:t>反汇编的结果 </a:t>
+            </a:r>
+            <a:r>
+              <a:rPr lang="en-US" altLang="zh-CN" dirty="0"/>
+              <a:t>device_tree..util..</a:t>
+            </a:r>
+            <a:r>
+              <a:rPr lang="en-US" altLang="zh-CN" dirty="0" err="1"/>
+              <a:t>SliceRead$GT</a:t>
+            </a:r>
+            <a:r>
+              <a:rPr lang="en-US" altLang="zh-CN" dirty="0"/>
+              <a:t>$</a:t>
+            </a:r>
+            <a:endParaRPr lang="zh-CN" altLang="en-US" dirty="0"/>
+          </a:p>
+        </p:txBody>
+      </p:sp>
+      <p:sp>
+        <p:nvSpPr>
+          <p:cNvPr id="4" name="灯片编号占位符 3">
+            <a:extLst>
+              <a:ext uri="{FF2B5EF4-FFF2-40B4-BE49-F238E27FC236}">
+                <a16:creationId xmlns:a16="http://schemas.microsoft.com/office/drawing/2014/main" id="{72EF3B65-1A77-7F31-9EEE-0F842E250889}"/>
+              </a:ext>
+            </a:extLst>
+          </p:cNvPr>
+          <p:cNvSpPr>
+            <a:spLocks noGrp="1"/>
+          </p:cNvSpPr>
+          <p:nvPr>
+            <p:ph type="sldNum" sz="quarter" idx="12"/>
+          </p:nvPr>
+        </p:nvSpPr>
+        <p:spPr/>
+        <p:txBody>
+          <a:bodyPr/>
+          <a:lstStyle/>
+          <a:p>
+            <a:fld id="{519AEA81-C1FD-4B2C-87D1-3FA637539CC6}" type="slidenum">
+              <a:rPr lang="zh-CN" altLang="en-US" smtClean="0"/>
+              <a:t>5</a:t>
+            </a:fld>
+            <a:endParaRPr lang="zh-CN" altLang="en-US" dirty="0"/>
+          </a:p>
+        </p:txBody>
+      </p:sp>
+      <p:pic>
+        <p:nvPicPr>
+          <p:cNvPr id="6" name="图片 5">
+            <a:extLst>
+              <a:ext uri="{FF2B5EF4-FFF2-40B4-BE49-F238E27FC236}">
+                <a16:creationId xmlns:a16="http://schemas.microsoft.com/office/drawing/2014/main" id="{EFD11C35-3923-93DB-47A3-6486C7B1E3CD}"/>
+              </a:ext>
+            </a:extLst>
+          </p:cNvPr>
+          <p:cNvPicPr>
+            <a:picLocks noChangeAspect="1"/>
+          </p:cNvPicPr>
+          <p:nvPr/>
+        </p:nvPicPr>
+        <p:blipFill>
+          <a:blip r:embed="rId2">
+            <a:extLst>
+              <a:ext uri="{28A0092B-C50C-407E-A947-70E740481C1C}">
+                <a14:useLocalDpi xmlns:a14="http://schemas.microsoft.com/office/drawing/2010/main" val="0"/>
+              </a:ext>
+            </a:extLst>
+          </a:blip>
+          <a:stretch>
+            <a:fillRect/>
+          </a:stretch>
+        </p:blipFill>
+        <p:spPr>
+          <a:xfrm>
+            <a:off x="838200" y="2440814"/>
+            <a:ext cx="6596594" cy="4155248"/>
+          </a:xfrm>
+          <a:prstGeom prst="rect">
+            <a:avLst/>
+          </a:prstGeom>
+        </p:spPr>
+      </p:pic>
+    </p:spTree>
+    <p:extLst>
+      <p:ext uri="{BB962C8B-B14F-4D97-AF65-F5344CB8AC3E}">
+        <p14:creationId xmlns:p14="http://schemas.microsoft.com/office/powerpoint/2010/main" val="2347504704"/>
+      </p:ext>
+    </p:extLst>
+  </p:cSld>
+  <p:clrMapOvr>
+    <a:masterClrMapping/>
+  </p:clrMapOvr>
+</p:sld>
+</file>
+
+<file path=ppt/slides/slide6.xml><?xml version="1.0" encoding="utf-8"?>
+<p:sld xmlns:a="http://schemas.openxmlformats.org/drawingml/2006/main" xmlns:r="http://schemas.openxmlformats.org/officeDocument/2006/relationships" xmlns:p="http://schemas.openxmlformats.org/presentationml/2006/main">
+  <p:cSld>
+    <p:spTree>
+      <p:nvGrpSpPr>
+        <p:cNvPr id="1" name=""/>
+        <p:cNvGrpSpPr/>
+        <p:nvPr/>
+      </p:nvGrpSpPr>
+      <p:grpSpPr>
+        <a:xfrm>
+          <a:off x="0" y="0"/>
+          <a:ext cx="0" cy="0"/>
+          <a:chOff x="0" y="0"/>
+          <a:chExt cx="0" cy="0"/>
+        </a:xfrm>
+      </p:grpSpPr>
+      <p:sp>
+        <p:nvSpPr>
+          <p:cNvPr id="2" name="标题 1">
+            <a:extLst>
+              <a:ext uri="{FF2B5EF4-FFF2-40B4-BE49-F238E27FC236}">
+                <a16:creationId xmlns:a16="http://schemas.microsoft.com/office/drawing/2014/main" id="{F8FC960D-2D1B-0239-D7AD-9EC782862D42}"/>
+              </a:ext>
+            </a:extLst>
+          </p:cNvPr>
+          <p:cNvSpPr>
+            <a:spLocks noGrp="1"/>
+          </p:cNvSpPr>
+          <p:nvPr>
+            <p:ph type="title"/>
+          </p:nvPr>
+        </p:nvSpPr>
+        <p:spPr/>
+        <p:txBody>
+          <a:bodyPr/>
+          <a:lstStyle/>
+          <a:p>
+            <a:r>
+              <a:rPr lang="zh-CN" altLang="en-US" dirty="0"/>
+              <a:t>目前问题</a:t>
+            </a:r>
+          </a:p>
+        </p:txBody>
+      </p:sp>
+      <p:sp>
+        <p:nvSpPr>
+          <p:cNvPr id="3" name="内容占位符 2">
+            <a:extLst>
+              <a:ext uri="{FF2B5EF4-FFF2-40B4-BE49-F238E27FC236}">
+                <a16:creationId xmlns:a16="http://schemas.microsoft.com/office/drawing/2014/main" id="{1244FD8C-BDF5-7356-DE89-15B71A3531CD}"/>
+              </a:ext>
+            </a:extLst>
+          </p:cNvPr>
+          <p:cNvSpPr>
+            <a:spLocks noGrp="1"/>
+          </p:cNvSpPr>
+          <p:nvPr>
+            <p:ph idx="1"/>
+          </p:nvPr>
+        </p:nvSpPr>
+        <p:spPr/>
+        <p:txBody>
+          <a:bodyPr/>
+          <a:lstStyle/>
+          <a:p>
+            <a:r>
+              <a:rPr lang="en-US" altLang="zh-CN" dirty="0"/>
+              <a:t>end</a:t>
+            </a:r>
+            <a:r>
+              <a:rPr lang="zh-CN" altLang="en-US" dirty="0"/>
+              <a:t>的返回地址可能不对</a:t>
+            </a:r>
+          </a:p>
+        </p:txBody>
+      </p:sp>
+      <p:sp>
+        <p:nvSpPr>
+          <p:cNvPr id="4" name="灯片编号占位符 3">
+            <a:extLst>
+              <a:ext uri="{FF2B5EF4-FFF2-40B4-BE49-F238E27FC236}">
+                <a16:creationId xmlns:a16="http://schemas.microsoft.com/office/drawing/2014/main" id="{4276AA5A-E3C1-807A-7D8F-2DFEB400D377}"/>
+              </a:ext>
+            </a:extLst>
+          </p:cNvPr>
+          <p:cNvSpPr>
+            <a:spLocks noGrp="1"/>
+          </p:cNvSpPr>
+          <p:nvPr>
+            <p:ph type="sldNum" sz="quarter" idx="12"/>
+          </p:nvPr>
+        </p:nvSpPr>
+        <p:spPr/>
+        <p:txBody>
+          <a:bodyPr/>
+          <a:lstStyle/>
+          <a:p>
+            <a:fld id="{519AEA81-C1FD-4B2C-87D1-3FA637539CC6}" type="slidenum">
+              <a:rPr lang="zh-CN" altLang="en-US" smtClean="0"/>
+              <a:t>6</a:t>
+            </a:fld>
+            <a:endParaRPr lang="zh-CN" altLang="en-US" dirty="0"/>
+          </a:p>
+        </p:txBody>
+      </p:sp>
+      <p:pic>
+        <p:nvPicPr>
+          <p:cNvPr id="6" name="图片 5">
+            <a:extLst>
+              <a:ext uri="{FF2B5EF4-FFF2-40B4-BE49-F238E27FC236}">
+                <a16:creationId xmlns:a16="http://schemas.microsoft.com/office/drawing/2014/main" id="{4109C5DD-6E06-5FA7-9123-72981257C767}"/>
+              </a:ext>
+            </a:extLst>
+          </p:cNvPr>
+          <p:cNvPicPr>
+            <a:picLocks noChangeAspect="1"/>
+          </p:cNvPicPr>
+          <p:nvPr/>
+        </p:nvPicPr>
+        <p:blipFill>
+          <a:blip r:embed="rId2">
+            <a:extLst>
+              <a:ext uri="{28A0092B-C50C-407E-A947-70E740481C1C}">
+                <a14:useLocalDpi xmlns:a14="http://schemas.microsoft.com/office/drawing/2010/main" val="0"/>
+              </a:ext>
+            </a:extLst>
+          </a:blip>
+          <a:stretch>
+            <a:fillRect/>
+          </a:stretch>
+        </p:blipFill>
+        <p:spPr>
+          <a:xfrm>
+            <a:off x="838200" y="2369100"/>
+            <a:ext cx="6191250" cy="4123775"/>
+          </a:xfrm>
+          <a:prstGeom prst="rect">
+            <a:avLst/>
+          </a:prstGeom>
+        </p:spPr>
+      </p:pic>
+    </p:spTree>
+    <p:extLst>
+      <p:ext uri="{BB962C8B-B14F-4D97-AF65-F5344CB8AC3E}">
+        <p14:creationId xmlns:p14="http://schemas.microsoft.com/office/powerpoint/2010/main" val="1227354387"/>
+      </p:ext>
+    </p:extLst>
+  </p:cSld>
+  <p:clrMapOvr>
+    <a:masterClrMapping/>
+  </p:clrMapOvr>
+</p:sld>
+</file>
+
+<file path=ppt/slides/slide7.xml><?xml version="1.0" encoding="utf-8"?>
+<p:sld xmlns:a="http://schemas.openxmlformats.org/drawingml/2006/main" xmlns:r="http://schemas.openxmlformats.org/officeDocument/2006/relationships" xmlns:p="http://schemas.openxmlformats.org/presentationml/2006/main">
+  <p:cSld>
+    <p:spTree>
+      <p:nvGrpSpPr>
+        <p:cNvPr id="1" name=""/>
+        <p:cNvGrpSpPr/>
+        <p:nvPr/>
+      </p:nvGrpSpPr>
+      <p:grpSpPr>
+        <a:xfrm>
+          <a:off x="0" y="0"/>
+          <a:ext cx="0" cy="0"/>
+          <a:chOff x="0" y="0"/>
+          <a:chExt cx="0" cy="0"/>
+        </a:xfrm>
+      </p:grpSpPr>
+      <p:sp>
+        <p:nvSpPr>
           <p:cNvPr id="7" name="标题 6"/>
           <p:cNvSpPr>
             <a:spLocks noGrp="1"/>
@@ -3874,7 +4631,6 @@
               <a:rPr lang="zh-CN" altLang="en-US"/>
               <a:t>感谢张译仁助教的鼎力支持！</a:t>
             </a:r>
-            <a:endParaRPr lang="zh-CN" altLang="en-US"/>
           </a:p>
         </p:txBody>
       </p:sp>
@@ -3895,6 +4651,7 @@
           <a:p>
             <a:fld id="{519AEA81-C1FD-4B2C-87D1-3FA637539CC6}" type="slidenum">
               <a:rPr lang="zh-CN" altLang="en-US" smtClean="0"/>
+              <a:t>7</a:t>
             </a:fld>
             <a:endParaRPr lang="zh-CN" altLang="en-US" dirty="0"/>
           </a:p>
@@ -4232,6 +4989,7 @@
       </a:lstStyle>
     </a:txDef>
   </a:objectDefaults>
+  <a:extraClrSchemeLst/>
   <a:extLst>
     <a:ext uri="{05A4C25C-085E-4340-85A3-A5531E510DB2}">
       <thm15:themeFamily xmlns:thm15="http://schemas.microsoft.com/office/thememl/2012/main" name="Office Theme" id="{62F939B6-93AF-4DB8-9C6B-D6C7DFDC589F}" vid="{4A3C46E8-61CC-4603-A589-7422A47A8E4A}"/>
@@ -4491,6 +5249,8 @@
       </a:bgFillStyleLst>
     </a:fmtScheme>
   </a:themeElements>
+  <a:objectDefaults/>
+  <a:extraClrSchemeLst/>
   <a:extLst>
     <a:ext uri="{05A4C25C-085E-4340-85A3-A5531E510DB2}">
       <thm15:themeFamily xmlns:thm15="http://schemas.microsoft.com/office/thememl/2012/main" name="Office Theme" id="{62F939B6-93AF-4DB8-9C6B-D6C7DFDC589F}" vid="{4A3C46E8-61CC-4603-A589-7422A47A8E4A}"/>
@@ -4750,6 +5510,8 @@
       </a:bgFillStyleLst>
     </a:fmtScheme>
   </a:themeElements>
+  <a:objectDefaults/>
+  <a:extraClrSchemeLst/>
   <a:extLst>
     <a:ext uri="{05A4C25C-085E-4340-85A3-A5531E510DB2}">
       <thm15:themeFamily xmlns:thm15="http://schemas.microsoft.com/office/thememl/2012/main" name="Office Theme" id="{62F939B6-93AF-4DB8-9C6B-D6C7DFDC589F}" vid="{4A3C46E8-61CC-4603-A589-7422A47A8E4A}"/>

</xml_diff>